<commit_message>
Update storage seq UML
</commit_message>
<xml_diff>
--- a/docs/diagrams/StorageSequenceDiagram.pptx
+++ b/docs/diagrams/StorageSequenceDiagram.pptx
@@ -4193,7 +4193,23 @@
                   <a:srgbClr val="0070C0"/>
                 </a:solidFill>
               </a:rPr>
-              <a:t>saveModulePlanner</a:t>
+              <a:t>handleModulePlanner</a:t>
+            </a:r>
+            <a:endParaRPr lang="en-US" sz="1200" dirty="0">
+              <a:solidFill>
+                <a:srgbClr val="0070C0"/>
+              </a:solidFill>
+            </a:endParaRPr>
+          </a:p>
+          <a:p>
+            <a:pPr algn="ctr"/>
+            <a:r>
+              <a:rPr lang="en-US" sz="1200" dirty="0" err="1">
+                <a:solidFill>
+                  <a:srgbClr val="0070C0"/>
+                </a:solidFill>
+              </a:rPr>
+              <a:t>ChangedEvent</a:t>
             </a:r>
             <a:r>
               <a:rPr lang="en-US" sz="1200" dirty="0">
@@ -4203,18 +4219,6 @@
               </a:rPr>
               <a:t>(</a:t>
             </a:r>
-          </a:p>
-          <a:p>
-            <a:pPr algn="ctr"/>
-            <a:r>
-              <a:rPr lang="en-US" sz="1200" dirty="0" err="1">
-                <a:solidFill>
-                  <a:srgbClr val="0070C0"/>
-                </a:solidFill>
-                <a:cs typeface="Calibri"/>
-              </a:rPr>
-              <a:t>modulePlanner</a:t>
-            </a:r>
             <a:r>
               <a:rPr lang="en-US" sz="1200" dirty="0">
                 <a:solidFill>
@@ -4222,7 +4226,7 @@
                 </a:solidFill>
                 <a:cs typeface="Calibri"/>
               </a:rPr>
-              <a:t>)</a:t>
+              <a:t>event)</a:t>
             </a:r>
             <a:endParaRPr lang="en-US" sz="1200" dirty="0">
               <a:solidFill>
@@ -4536,7 +4540,7 @@
             <a:pPr algn="ctr"/>
             <a:r>
               <a:rPr lang="en-US" sz="1200" dirty="0" err="1"/>
-              <a:t>modulePlanner</a:t>
+              <a:t>event.data</a:t>
             </a:r>
             <a:r>
               <a:rPr lang="en-US" sz="1200" dirty="0"/>

</xml_diff>

<commit_message>
Update storage UML color to orange
</commit_message>
<xml_diff>
--- a/docs/diagrams/StorageSequenceDiagram.pptx
+++ b/docs/diagrams/StorageSequenceDiagram.pptx
@@ -3911,9 +3911,9 @@
             </a:avLst>
           </a:prstGeom>
           <a:solidFill>
-            <a:schemeClr val="accent1">
-              <a:lumMod val="20000"/>
-              <a:lumOff val="80000"/>
+            <a:schemeClr val="accent4">
+              <a:lumMod val="40000"/>
+              <a:lumOff val="60000"/>
             </a:schemeClr>
           </a:solidFill>
           <a:ln w="19050">
@@ -3942,12 +3942,16 @@
             <a:r>
               <a:rPr lang="en-US" sz="1200" b="1" dirty="0">
                 <a:solidFill>
-                  <a:srgbClr val="0070C0"/>
+                  <a:schemeClr val="accent2"/>
                 </a:solidFill>
               </a:rPr>
               <a:t>Storage</a:t>
             </a:r>
-            <a:endParaRPr lang="en-US" dirty="0"/>
+            <a:endParaRPr lang="en-US" dirty="0">
+              <a:solidFill>
+                <a:schemeClr val="accent2"/>
+              </a:solidFill>
+            </a:endParaRPr>
           </a:p>
         </p:txBody>
       </p:sp>
@@ -3972,11 +3976,11 @@
             <a:avLst/>
           </a:prstGeom>
           <a:solidFill>
-            <a:srgbClr val="0070C0"/>
+            <a:schemeClr val="accent2"/>
           </a:solidFill>
           <a:ln w="19050">
             <a:solidFill>
-              <a:srgbClr val="0070C0"/>
+              <a:schemeClr val="accent4"/>
             </a:solidFill>
           </a:ln>
           <a:effectLst/>
@@ -4040,7 +4044,7 @@
           </a:prstGeom>
           <a:ln w="19050">
             <a:solidFill>
-              <a:srgbClr val="0070C0"/>
+              <a:schemeClr val="accent4"/>
             </a:solidFill>
             <a:prstDash val="sysDash"/>
           </a:ln>
@@ -4082,11 +4086,11 @@
             <a:avLst/>
           </a:prstGeom>
           <a:solidFill>
-            <a:srgbClr val="0070C0"/>
+            <a:schemeClr val="accent2"/>
           </a:solidFill>
           <a:ln>
             <a:solidFill>
-              <a:srgbClr val="0070C0"/>
+              <a:schemeClr val="accent4"/>
             </a:solidFill>
           </a:ln>
           <a:effectLst/>
@@ -4138,7 +4142,7 @@
           </a:prstGeom>
           <a:ln w="19050">
             <a:solidFill>
-              <a:srgbClr val="00B050"/>
+              <a:schemeClr val="accent4"/>
             </a:solidFill>
             <a:tailEnd type="arrow"/>
           </a:ln>
@@ -4172,13 +4176,16 @@
         </p:nvSpPr>
         <p:spPr>
           <a:xfrm>
-            <a:off x="294580" y="1162698"/>
-            <a:ext cx="1936816" cy="369332"/>
+            <a:off x="398573" y="1127700"/>
+            <a:ext cx="1543959" cy="369332"/>
           </a:xfrm>
           <a:prstGeom prst="rect">
             <a:avLst/>
           </a:prstGeom>
           <a:noFill/>
+          <a:ln>
+            <a:noFill/>
+          </a:ln>
         </p:spPr>
         <p:txBody>
           <a:bodyPr wrap="square" lIns="0" tIns="0" rIns="0" bIns="0" rtlCol="0" anchor="t">
@@ -4190,14 +4197,14 @@
             <a:r>
               <a:rPr lang="en-US" sz="1200" dirty="0" err="1">
                 <a:solidFill>
-                  <a:srgbClr val="0070C0"/>
+                  <a:schemeClr val="accent2"/>
                 </a:solidFill>
               </a:rPr>
               <a:t>handleModulePlanner</a:t>
             </a:r>
             <a:endParaRPr lang="en-US" sz="1200" dirty="0">
               <a:solidFill>
-                <a:srgbClr val="0070C0"/>
+                <a:schemeClr val="accent2"/>
               </a:solidFill>
             </a:endParaRPr>
           </a:p>
@@ -4206,7 +4213,7 @@
             <a:r>
               <a:rPr lang="en-US" sz="1200" dirty="0" err="1">
                 <a:solidFill>
-                  <a:srgbClr val="0070C0"/>
+                  <a:schemeClr val="accent2"/>
                 </a:solidFill>
               </a:rPr>
               <a:t>ChangedEvent</a:t>
@@ -4214,7 +4221,7 @@
             <a:r>
               <a:rPr lang="en-US" sz="1200" dirty="0">
                 <a:solidFill>
-                  <a:srgbClr val="0070C0"/>
+                  <a:schemeClr val="accent2"/>
                 </a:solidFill>
               </a:rPr>
               <a:t>(</a:t>
@@ -4222,7 +4229,7 @@
             <a:r>
               <a:rPr lang="en-US" sz="1200" dirty="0">
                 <a:solidFill>
-                  <a:srgbClr val="0070C0"/>
+                  <a:schemeClr val="accent2"/>
                 </a:solidFill>
                 <a:cs typeface="Calibri"/>
               </a:rPr>
@@ -4230,7 +4237,7 @@
             </a:r>
             <a:endParaRPr lang="en-US" sz="1200" dirty="0">
               <a:solidFill>
-                <a:srgbClr val="0070C0"/>
+                <a:schemeClr val="accent2"/>
               </a:solidFill>
             </a:endParaRPr>
           </a:p>
@@ -4257,11 +4264,11 @@
             <a:avLst/>
           </a:prstGeom>
           <a:solidFill>
-            <a:srgbClr val="0070C0"/>
+            <a:schemeClr val="accent2"/>
           </a:solidFill>
           <a:ln w="19050">
             <a:solidFill>
-              <a:srgbClr val="0070C0"/>
+              <a:schemeClr val="accent4"/>
             </a:solidFill>
           </a:ln>
           <a:effectLst/>
@@ -4343,11 +4350,11 @@
             <a:avLst/>
           </a:prstGeom>
           <a:solidFill>
-            <a:srgbClr val="0070C0"/>
+            <a:schemeClr val="accent2"/>
           </a:solidFill>
           <a:ln w="19050">
             <a:solidFill>
-              <a:srgbClr val="0070C0"/>
+              <a:schemeClr val="accent4"/>
             </a:solidFill>
           </a:ln>
           <a:effectLst/>
@@ -4412,7 +4419,7 @@
           </a:prstGeom>
           <a:ln w="19050">
             <a:solidFill>
-              <a:srgbClr val="0070C0"/>
+              <a:schemeClr val="accent4"/>
             </a:solidFill>
             <a:prstDash val="sysDash"/>
           </a:ln>
@@ -4454,11 +4461,11 @@
             <a:avLst/>
           </a:prstGeom>
           <a:solidFill>
-            <a:srgbClr val="0070C0"/>
+            <a:schemeClr val="accent2"/>
           </a:solidFill>
           <a:ln>
             <a:solidFill>
-              <a:srgbClr val="0070C0"/>
+              <a:schemeClr val="accent4"/>
             </a:solidFill>
           </a:ln>
           <a:effectLst/>
@@ -4507,6 +4514,9 @@
             <a:avLst/>
           </a:prstGeom>
           <a:noFill/>
+          <a:ln>
+            <a:noFill/>
+          </a:ln>
         </p:spPr>
         <p:txBody>
           <a:bodyPr wrap="square" lIns="0" tIns="0" rIns="0" bIns="0" rtlCol="0" anchor="t">
@@ -4527,41 +4537,76 @@
           <a:p>
             <a:pPr algn="ctr"/>
             <a:r>
-              <a:rPr lang="en-US" sz="1200" dirty="0" err="1"/>
+              <a:rPr lang="en-US" sz="1200" dirty="0" err="1">
+                <a:solidFill>
+                  <a:schemeClr val="accent2"/>
+                </a:solidFill>
+              </a:rPr>
               <a:t>saveModulePlanner</a:t>
             </a:r>
             <a:r>
-              <a:rPr lang="en-US" sz="1200" dirty="0"/>
+              <a:rPr lang="en-US" sz="1200" dirty="0">
+                <a:solidFill>
+                  <a:schemeClr val="accent2"/>
+                </a:solidFill>
+              </a:rPr>
               <a:t>(</a:t>
             </a:r>
-            <a:endParaRPr lang="en-US" dirty="0"/>
+            <a:endParaRPr lang="en-US" dirty="0">
+              <a:solidFill>
+                <a:schemeClr val="accent2"/>
+              </a:solidFill>
+            </a:endParaRPr>
           </a:p>
           <a:p>
             <a:pPr algn="ctr"/>
             <a:r>
-              <a:rPr lang="en-US" sz="1200" dirty="0" err="1"/>
+              <a:rPr lang="en-US" sz="1200" dirty="0" err="1">
+                <a:solidFill>
+                  <a:schemeClr val="accent2"/>
+                </a:solidFill>
+              </a:rPr>
               <a:t>event.data</a:t>
             </a:r>
             <a:r>
-              <a:rPr lang="en-US" sz="1200" dirty="0"/>
+              <a:rPr lang="en-US" sz="1200" dirty="0">
+                <a:solidFill>
+                  <a:schemeClr val="accent2"/>
+                </a:solidFill>
+              </a:rPr>
               <a:t>,</a:t>
             </a:r>
           </a:p>
           <a:p>
             <a:pPr algn="ctr"/>
             <a:r>
-              <a:rPr lang="en-US" sz="1200" dirty="0"/>
+              <a:rPr lang="en-US" sz="1200" dirty="0">
+                <a:solidFill>
+                  <a:schemeClr val="accent2"/>
+                </a:solidFill>
+              </a:rPr>
               <a:t> </a:t>
             </a:r>
             <a:r>
-              <a:rPr lang="en-US" sz="1200" dirty="0" err="1"/>
+              <a:rPr lang="en-US" sz="1200" dirty="0" err="1">
+                <a:solidFill>
+                  <a:schemeClr val="accent2"/>
+                </a:solidFill>
+              </a:rPr>
               <a:t>filePath</a:t>
             </a:r>
             <a:r>
-              <a:rPr lang="en-US" sz="1200" dirty="0"/>
+              <a:rPr lang="en-US" sz="1200" dirty="0">
+                <a:solidFill>
+                  <a:schemeClr val="accent2"/>
+                </a:solidFill>
+              </a:rPr>
               <a:t>)</a:t>
             </a:r>
             <a:endParaRPr lang="en-US" sz="1200" dirty="0">
+              <a:solidFill>
+                <a:schemeClr val="accent2"/>
+              </a:solidFill>
               <a:cs typeface="Calibri"/>
             </a:endParaRPr>
           </a:p>
@@ -4591,7 +4636,7 @@
           </a:prstGeom>
           <a:ln w="19050">
             <a:solidFill>
-              <a:srgbClr val="0070C0"/>
+              <a:schemeClr val="accent4"/>
             </a:solidFill>
             <a:tailEnd type="arrow"/>
           </a:ln>
@@ -4635,7 +4680,7 @@
           </a:prstGeom>
           <a:ln w="19050">
             <a:solidFill>
-              <a:srgbClr val="0070C0"/>
+              <a:schemeClr val="accent4"/>
             </a:solidFill>
             <a:tailEnd type="arrow"/>
           </a:ln>
@@ -4679,7 +4724,7 @@
           </a:prstGeom>
           <a:ln w="19050">
             <a:solidFill>
-              <a:srgbClr val="0070C0"/>
+              <a:schemeClr val="accent4"/>
             </a:solidFill>
             <a:prstDash val="sysDash"/>
           </a:ln>
@@ -4721,11 +4766,11 @@
             <a:avLst/>
           </a:prstGeom>
           <a:solidFill>
-            <a:srgbClr val="0070C0"/>
+            <a:schemeClr val="accent2"/>
           </a:solidFill>
           <a:ln>
             <a:solidFill>
-              <a:srgbClr val="0070C0"/>
+              <a:schemeClr val="accent4"/>
             </a:solidFill>
           </a:ln>
           <a:effectLst/>
@@ -4777,7 +4822,7 @@
           </a:prstGeom>
           <a:ln w="19050">
             <a:solidFill>
-              <a:srgbClr val="0070C0"/>
+              <a:schemeClr val="accent4"/>
             </a:solidFill>
             <a:prstDash val="sysDash"/>
             <a:headEnd type="arrow" w="med" len="med"/>
@@ -4813,13 +4858,16 @@
         </p:nvSpPr>
         <p:spPr>
           <a:xfrm>
-            <a:off x="4090582" y="2874679"/>
+            <a:off x="4132640" y="2848220"/>
             <a:ext cx="2559855" cy="184666"/>
           </a:xfrm>
           <a:prstGeom prst="rect">
             <a:avLst/>
           </a:prstGeom>
           <a:noFill/>
+          <a:ln>
+            <a:noFill/>
+          </a:ln>
         </p:spPr>
         <p:txBody>
           <a:bodyPr wrap="square" lIns="0" tIns="0" rIns="0" bIns="0" rtlCol="0" anchor="t">
@@ -4840,30 +4888,58 @@
           <a:p>
             <a:pPr algn="ctr"/>
             <a:r>
-              <a:rPr lang="en-US" sz="1200" dirty="0" err="1"/>
+              <a:rPr lang="en-US" sz="1200" dirty="0" err="1">
+                <a:solidFill>
+                  <a:schemeClr val="accent2"/>
+                </a:solidFill>
+              </a:rPr>
               <a:t>saveJsonFile</a:t>
             </a:r>
             <a:r>
-              <a:rPr lang="en-US" sz="1200" dirty="0"/>
+              <a:rPr lang="en-US" sz="1200" dirty="0">
+                <a:solidFill>
+                  <a:schemeClr val="accent2"/>
+                </a:solidFill>
+              </a:rPr>
               <a:t>(</a:t>
             </a:r>
             <a:r>
-              <a:rPr lang="en-US" sz="1200" dirty="0" err="1"/>
+              <a:rPr lang="en-US" sz="1200" dirty="0" err="1">
+                <a:solidFill>
+                  <a:schemeClr val="accent2"/>
+                </a:solidFill>
+              </a:rPr>
               <a:t>mp</a:t>
             </a:r>
             <a:r>
-              <a:rPr lang="en-US" sz="1200" dirty="0"/>
+              <a:rPr lang="en-US" sz="1200" dirty="0">
+                <a:solidFill>
+                  <a:schemeClr val="accent2"/>
+                </a:solidFill>
+              </a:rPr>
               <a:t>, </a:t>
             </a:r>
             <a:r>
-              <a:rPr lang="en-US" sz="1200" dirty="0" err="1"/>
+              <a:rPr lang="en-US" sz="1200" dirty="0" err="1">
+                <a:solidFill>
+                  <a:schemeClr val="accent2"/>
+                </a:solidFill>
+              </a:rPr>
               <a:t>filePath</a:t>
             </a:r>
             <a:r>
-              <a:rPr lang="en-US" sz="1200" dirty="0"/>
+              <a:rPr lang="en-US" sz="1200" dirty="0">
+                <a:solidFill>
+                  <a:schemeClr val="accent2"/>
+                </a:solidFill>
+              </a:rPr>
               <a:t>)</a:t>
             </a:r>
-            <a:endParaRPr lang="en-US" dirty="0"/>
+            <a:endParaRPr lang="en-US" dirty="0">
+              <a:solidFill>
+                <a:schemeClr val="accent2"/>
+              </a:solidFill>
+            </a:endParaRPr>
           </a:p>
         </p:txBody>
       </p:sp>
@@ -4888,11 +4964,11 @@
             <a:avLst/>
           </a:prstGeom>
           <a:solidFill>
-            <a:srgbClr val="0070C0"/>
+            <a:schemeClr val="accent2"/>
           </a:solidFill>
           <a:ln w="19050">
             <a:solidFill>
-              <a:srgbClr val="0070C0"/>
+              <a:schemeClr val="accent4"/>
             </a:solidFill>
           </a:ln>
           <a:effectLst/>
@@ -4957,15 +5033,15 @@
         </p:nvCxnSpPr>
         <p:spPr>
           <a:xfrm flipV="1">
-            <a:off x="3931143" y="3125631"/>
-            <a:ext cx="3084423" cy="7187"/>
+            <a:off x="3966260" y="3125632"/>
+            <a:ext cx="3049306" cy="31968"/>
           </a:xfrm>
           <a:prstGeom prst="straightConnector1">
             <a:avLst/>
           </a:prstGeom>
           <a:ln w="19050">
             <a:solidFill>
-              <a:srgbClr val="0070C0"/>
+              <a:schemeClr val="accent4"/>
             </a:solidFill>
             <a:tailEnd type="arrow"/>
           </a:ln>
@@ -5009,7 +5085,7 @@
           </a:prstGeom>
           <a:ln w="19050">
             <a:solidFill>
-              <a:srgbClr val="0070C0"/>
+              <a:schemeClr val="accent4"/>
             </a:solidFill>
             <a:prstDash val="sysDash"/>
           </a:ln>
@@ -5051,11 +5127,11 @@
             <a:avLst/>
           </a:prstGeom>
           <a:solidFill>
-            <a:srgbClr val="0070C0"/>
+            <a:schemeClr val="accent2"/>
           </a:solidFill>
           <a:ln>
             <a:solidFill>
-              <a:srgbClr val="0070C0"/>
+              <a:schemeClr val="accent4"/>
             </a:solidFill>
           </a:ln>
           <a:effectLst/>
@@ -5104,11 +5180,11 @@
             <a:avLst/>
           </a:prstGeom>
           <a:solidFill>
-            <a:srgbClr val="0070C0"/>
+            <a:schemeClr val="accent2"/>
           </a:solidFill>
           <a:ln>
             <a:solidFill>
-              <a:srgbClr val="0070C0"/>
+              <a:schemeClr val="accent4"/>
             </a:solidFill>
           </a:ln>
           <a:effectLst/>
@@ -5160,7 +5236,7 @@
           </a:prstGeom>
           <a:ln w="19050">
             <a:solidFill>
-              <a:srgbClr val="0070C0"/>
+              <a:schemeClr val="accent4"/>
             </a:solidFill>
             <a:prstDash val="sysDash"/>
             <a:headEnd type="arrow" w="med" len="med"/>
@@ -5206,7 +5282,7 @@
           </a:prstGeom>
           <a:ln w="19050">
             <a:solidFill>
-              <a:srgbClr val="0070C0"/>
+              <a:schemeClr val="accent4"/>
             </a:solidFill>
             <a:prstDash val="sysDash"/>
             <a:headEnd type="arrow" w="med" len="med"/>
@@ -5252,7 +5328,7 @@
           </a:prstGeom>
           <a:ln w="19050">
             <a:solidFill>
-              <a:srgbClr val="0070C0"/>
+              <a:schemeClr val="accent4"/>
             </a:solidFill>
             <a:prstDash val="sysDash"/>
             <a:headEnd type="arrow" w="med" len="med"/>
@@ -5294,6 +5370,10 @@
           <a:prstGeom prst="rect">
             <a:avLst/>
           </a:prstGeom>
+          <a:noFill/>
+          <a:ln>
+            <a:noFill/>
+          </a:ln>
         </p:spPr>
         <p:txBody>
           <a:bodyPr rot="0" spcFirstLastPara="0" vertOverflow="overflow" horzOverflow="overflow" vert="horz" wrap="square" lIns="91440" tIns="45720" rIns="91440" bIns="45720" numCol="1" spcCol="0" rtlCol="0" fromWordArt="0" anchor="t" anchorCtr="0" forceAA="0" compatLnSpc="1">

</xml_diff>

<commit_message>
add major enhancement to ppp
</commit_message>
<xml_diff>
--- a/docs/diagrams/StorageSequenceDiagram.pptx
+++ b/docs/diagrams/StorageSequenceDiagram.pptx
@@ -802,7 +802,7 @@
           <a:p>
             <a:fld id="{1A1E3181-4089-4178-A264-7BE145A909A0}" type="datetimeFigureOut">
               <a:rPr lang="en-SG" smtClean="0"/>
-              <a:t>10/11/2018</a:t>
+              <a:t>12/11/2018</a:t>
             </a:fld>
             <a:endParaRPr lang="en-SG"/>
           </a:p>
@@ -1002,7 +1002,7 @@
           <a:p>
             <a:fld id="{1A1E3181-4089-4178-A264-7BE145A909A0}" type="datetimeFigureOut">
               <a:rPr lang="en-SG" smtClean="0"/>
-              <a:t>10/11/2018</a:t>
+              <a:t>12/11/2018</a:t>
             </a:fld>
             <a:endParaRPr lang="en-SG"/>
           </a:p>
@@ -1212,7 +1212,7 @@
           <a:p>
             <a:fld id="{1A1E3181-4089-4178-A264-7BE145A909A0}" type="datetimeFigureOut">
               <a:rPr lang="en-SG" smtClean="0"/>
-              <a:t>10/11/2018</a:t>
+              <a:t>12/11/2018</a:t>
             </a:fld>
             <a:endParaRPr lang="en-SG"/>
           </a:p>
@@ -1412,7 +1412,7 @@
           <a:p>
             <a:fld id="{1A1E3181-4089-4178-A264-7BE145A909A0}" type="datetimeFigureOut">
               <a:rPr lang="en-SG" smtClean="0"/>
-              <a:t>10/11/2018</a:t>
+              <a:t>12/11/2018</a:t>
             </a:fld>
             <a:endParaRPr lang="en-SG"/>
           </a:p>
@@ -1688,7 +1688,7 @@
           <a:p>
             <a:fld id="{1A1E3181-4089-4178-A264-7BE145A909A0}" type="datetimeFigureOut">
               <a:rPr lang="en-SG" smtClean="0"/>
-              <a:t>10/11/2018</a:t>
+              <a:t>12/11/2018</a:t>
             </a:fld>
             <a:endParaRPr lang="en-SG"/>
           </a:p>
@@ -1956,7 +1956,7 @@
           <a:p>
             <a:fld id="{1A1E3181-4089-4178-A264-7BE145A909A0}" type="datetimeFigureOut">
               <a:rPr lang="en-SG" smtClean="0"/>
-              <a:t>10/11/2018</a:t>
+              <a:t>12/11/2018</a:t>
             </a:fld>
             <a:endParaRPr lang="en-SG"/>
           </a:p>
@@ -2371,7 +2371,7 @@
           <a:p>
             <a:fld id="{1A1E3181-4089-4178-A264-7BE145A909A0}" type="datetimeFigureOut">
               <a:rPr lang="en-SG" smtClean="0"/>
-              <a:t>10/11/2018</a:t>
+              <a:t>12/11/2018</a:t>
             </a:fld>
             <a:endParaRPr lang="en-SG"/>
           </a:p>
@@ -2513,7 +2513,7 @@
           <a:p>
             <a:fld id="{1A1E3181-4089-4178-A264-7BE145A909A0}" type="datetimeFigureOut">
               <a:rPr lang="en-SG" smtClean="0"/>
-              <a:t>10/11/2018</a:t>
+              <a:t>12/11/2018</a:t>
             </a:fld>
             <a:endParaRPr lang="en-SG"/>
           </a:p>
@@ -2626,7 +2626,7 @@
           <a:p>
             <a:fld id="{1A1E3181-4089-4178-A264-7BE145A909A0}" type="datetimeFigureOut">
               <a:rPr lang="en-SG" smtClean="0"/>
-              <a:t>10/11/2018</a:t>
+              <a:t>12/11/2018</a:t>
             </a:fld>
             <a:endParaRPr lang="en-SG"/>
           </a:p>
@@ -2939,7 +2939,7 @@
           <a:p>
             <a:fld id="{1A1E3181-4089-4178-A264-7BE145A909A0}" type="datetimeFigureOut">
               <a:rPr lang="en-SG" smtClean="0"/>
-              <a:t>10/11/2018</a:t>
+              <a:t>12/11/2018</a:t>
             </a:fld>
             <a:endParaRPr lang="en-SG"/>
           </a:p>
@@ -3228,7 +3228,7 @@
           <a:p>
             <a:fld id="{1A1E3181-4089-4178-A264-7BE145A909A0}" type="datetimeFigureOut">
               <a:rPr lang="en-SG" smtClean="0"/>
-              <a:t>10/11/2018</a:t>
+              <a:t>12/11/2018</a:t>
             </a:fld>
             <a:endParaRPr lang="en-SG"/>
           </a:p>
@@ -3471,7 +3471,7 @@
           <a:p>
             <a:fld id="{1A1E3181-4089-4178-A264-7BE145A909A0}" type="datetimeFigureOut">
               <a:rPr lang="en-SG" smtClean="0"/>
-              <a:t>10/11/2018</a:t>
+              <a:t>12/11/2018</a:t>
             </a:fld>
             <a:endParaRPr lang="en-SG"/>
           </a:p>
@@ -4715,9 +4715,9 @@
           <p:nvPr/>
         </p:nvCxnSpPr>
         <p:spPr>
-          <a:xfrm>
-            <a:off x="5457594" y="2317618"/>
-            <a:ext cx="1" cy="2117792"/>
+          <a:xfrm flipH="1">
+            <a:off x="5499418" y="2145574"/>
+            <a:ext cx="10911" cy="2793100"/>
           </a:xfrm>
           <a:prstGeom prst="line">
             <a:avLst/>
@@ -5364,8 +5364,8 @@
         </p:nvSpPr>
         <p:spPr>
           <a:xfrm>
-            <a:off x="5228326" y="4099524"/>
-            <a:ext cx="406880" cy="588369"/>
+            <a:off x="5326128" y="4729373"/>
+            <a:ext cx="76710" cy="584775"/>
           </a:xfrm>
           <a:prstGeom prst="rect">
             <a:avLst/>

</xml_diff>